<commit_message>
Minor updates to the presentation.
</commit_message>
<xml_diff>
--- a/fitel_presentation/Analysis of Statistical Spam Classifiers for Text Messages.pptx
+++ b/fitel_presentation/Analysis of Statistical Spam Classifiers for Text Messages.pptx
@@ -215,7 +215,7 @@
           <a:p>
             <a:fld id="{0BA243C8-8C0C-4600-914B-457D96B897EA}" type="datetimeFigureOut">
               <a:rPr lang="en-US" smtClean="0"/>
-              <a:t>2016-06-02</a:t>
+              <a:t>2016-06-03</a:t>
             </a:fld>
             <a:endParaRPr lang="en-US"/>
           </a:p>
@@ -1320,7 +1320,6 @@
               <a:rPr lang="en-US"/>
               <a:t>Click to edit Master title style</a:t>
             </a:r>
-            <a:endParaRPr lang="en-US"/>
           </a:p>
         </p:txBody>
       </p:sp>
@@ -1385,7 +1384,6 @@
               <a:rPr lang="en-US"/>
               <a:t>Click to edit Master subtitle style</a:t>
             </a:r>
-            <a:endParaRPr lang="en-US"/>
           </a:p>
         </p:txBody>
       </p:sp>
@@ -1503,7 +1501,6 @@
               <a:rPr lang="en-US"/>
               <a:t>Click to edit Master title style</a:t>
             </a:r>
-            <a:endParaRPr lang="en-US"/>
           </a:p>
         </p:txBody>
       </p:sp>
@@ -1555,7 +1552,6 @@
               <a:rPr lang="en-US"/>
               <a:t>Fifth level</a:t>
             </a:r>
-            <a:endParaRPr lang="en-US"/>
           </a:p>
         </p:txBody>
       </p:sp>
@@ -1682,7 +1678,6 @@
               <a:rPr lang="en-US"/>
               <a:t>Click to edit Master title style</a:t>
             </a:r>
-            <a:endParaRPr lang="en-US"/>
           </a:p>
         </p:txBody>
       </p:sp>
@@ -1919,7 +1914,6 @@
               <a:rPr lang="en-US"/>
               <a:t>Click to edit Master title style</a:t>
             </a:r>
-            <a:endParaRPr lang="en-US"/>
           </a:p>
         </p:txBody>
       </p:sp>
@@ -1976,7 +1970,6 @@
               <a:rPr lang="en-US"/>
               <a:t>Fifth level</a:t>
             </a:r>
-            <a:endParaRPr lang="en-US"/>
           </a:p>
         </p:txBody>
       </p:sp>
@@ -2033,7 +2026,6 @@
               <a:rPr lang="en-US"/>
               <a:t>Fifth level</a:t>
             </a:r>
-            <a:endParaRPr lang="en-US"/>
           </a:p>
         </p:txBody>
       </p:sp>
@@ -2156,7 +2148,6 @@
               <a:rPr lang="en-US"/>
               <a:t>Click to edit Master title style</a:t>
             </a:r>
-            <a:endParaRPr lang="en-US"/>
           </a:p>
         </p:txBody>
       </p:sp>
@@ -2278,7 +2269,6 @@
               <a:rPr lang="en-US"/>
               <a:t>Fifth level</a:t>
             </a:r>
-            <a:endParaRPr lang="en-US"/>
           </a:p>
         </p:txBody>
       </p:sp>
@@ -2400,7 +2390,6 @@
               <a:rPr lang="en-US"/>
               <a:t>Fifth level</a:t>
             </a:r>
-            <a:endParaRPr lang="en-US"/>
           </a:p>
         </p:txBody>
       </p:sp>
@@ -2518,7 +2507,6 @@
               <a:rPr lang="en-US"/>
               <a:t>Click to edit Master title style</a:t>
             </a:r>
-            <a:endParaRPr lang="en-US"/>
           </a:p>
         </p:txBody>
       </p:sp>
@@ -2740,7 +2728,6 @@
               <a:rPr lang="en-US"/>
               <a:t>Click to edit Master title style</a:t>
             </a:r>
-            <a:endParaRPr lang="en-US"/>
           </a:p>
         </p:txBody>
       </p:sp>
@@ -2825,7 +2812,6 @@
               <a:rPr lang="en-US"/>
               <a:t>Fifth level</a:t>
             </a:r>
-            <a:endParaRPr lang="en-US"/>
           </a:p>
         </p:txBody>
       </p:sp>
@@ -3185,7 +3171,6 @@
               <a:rPr lang="en-US"/>
               <a:t>Click to edit Master title style</a:t>
             </a:r>
-            <a:endParaRPr lang="en-US"/>
           </a:p>
         </p:txBody>
       </p:sp>
@@ -3429,7 +3414,6 @@
               <a:rPr lang="en-US"/>
               <a:t>Click to edit Master title style</a:t>
             </a:r>
-            <a:endParaRPr lang="en-US"/>
           </a:p>
         </p:txBody>
       </p:sp>
@@ -3481,7 +3465,6 @@
               <a:rPr lang="en-US"/>
               <a:t>Fifth level</a:t>
             </a:r>
-            <a:endParaRPr lang="en-US"/>
           </a:p>
         </p:txBody>
       </p:sp>
@@ -3604,7 +3587,6 @@
               <a:rPr lang="en-US"/>
               <a:t>Click to edit Master title style</a:t>
             </a:r>
-            <a:endParaRPr lang="en-US"/>
           </a:p>
         </p:txBody>
       </p:sp>
@@ -3661,7 +3643,6 @@
               <a:rPr lang="en-US"/>
               <a:t>Fifth level</a:t>
             </a:r>
-            <a:endParaRPr lang="en-US"/>
           </a:p>
         </p:txBody>
       </p:sp>
@@ -5910,7 +5891,6 @@
               <a:rPr lang="en-US"/>
               <a:t>Click to edit Master title style</a:t>
             </a:r>
-            <a:endParaRPr lang="en-US"/>
           </a:p>
         </p:txBody>
       </p:sp>
@@ -5972,7 +5952,6 @@
               <a:rPr lang="en-US"/>
               <a:t>Fifth level</a:t>
             </a:r>
-            <a:endParaRPr lang="en-US"/>
           </a:p>
         </p:txBody>
       </p:sp>
@@ -6994,8 +6973,8 @@
           </a:p>
         </p:txBody>
       </p:sp>
-      <mc:AlternateContent xmlns:mc="http://schemas.openxmlformats.org/markup-compatibility/2006">
-        <mc:Choice xmlns:a14="http://schemas.microsoft.com/office/drawing/2010/main" Requires="a14">
+      <mc:AlternateContent xmlns:mc="http://schemas.openxmlformats.org/markup-compatibility/2006" xmlns:a14="http://schemas.microsoft.com/office/drawing/2010/main">
+        <mc:Choice Requires="a14">
           <p:sp>
             <p:nvSpPr>
               <p:cNvPr id="3" name="Content Placeholder 2"/>
@@ -7203,7 +7182,7 @@
             </p:txBody>
           </p:sp>
         </mc:Choice>
-        <mc:Fallback>
+        <mc:Fallback xmlns="">
           <p:sp>
             <p:nvSpPr>
               <p:cNvPr id="3" name="Content Placeholder 2"/>
@@ -7861,8 +7840,8 @@
           </a:p>
         </p:txBody>
       </p:sp>
-      <mc:AlternateContent xmlns:mc="http://schemas.openxmlformats.org/markup-compatibility/2006">
-        <mc:Choice xmlns:a14="http://schemas.microsoft.com/office/drawing/2010/main" Requires="a14">
+      <mc:AlternateContent xmlns:mc="http://schemas.openxmlformats.org/markup-compatibility/2006" xmlns:a14="http://schemas.microsoft.com/office/drawing/2010/main">
+        <mc:Choice Requires="a14">
           <p:sp>
             <p:nvSpPr>
               <p:cNvPr id="3" name="Content Placeholder 2"/>
@@ -8002,13 +7981,13 @@
                       <a:rPr lang="en-US" sz="2800" b="0" i="1" smtClean="0">
                         <a:latin typeface="Cambria Math" panose="02040503050406030204" pitchFamily="18" charset="0"/>
                       </a:rPr>
-                      <m:t>=1000(4,6% слів</m:t>
+                      <m:t>=1000(4,6% слів в д</m:t>
                     </m:r>
                     <m:r>
                       <a:rPr lang="uk-UA" sz="2800" b="0" i="1" smtClean="0">
                         <a:latin typeface="Cambria Math" panose="02040503050406030204" pitchFamily="18" charset="0"/>
                       </a:rPr>
-                      <m:t> в даному випадку)</m:t>
+                      <m:t>аному випадку)</m:t>
                     </m:r>
                   </m:oMath>
                 </a14:m>
@@ -8017,7 +7996,7 @@
             </p:txBody>
           </p:sp>
         </mc:Choice>
-        <mc:Fallback>
+        <mc:Fallback xmlns="">
           <p:sp>
             <p:nvSpPr>
               <p:cNvPr id="3" name="Content Placeholder 2"/>
@@ -8508,8 +8487,8 @@
           </a:p>
         </p:txBody>
       </p:sp>
-      <mc:AlternateContent xmlns:mc="http://schemas.openxmlformats.org/markup-compatibility/2006">
-        <mc:Choice xmlns:a14="http://schemas.microsoft.com/office/drawing/2010/main" Requires="a14">
+      <mc:AlternateContent xmlns:mc="http://schemas.openxmlformats.org/markup-compatibility/2006" xmlns:a14="http://schemas.microsoft.com/office/drawing/2010/main">
+        <mc:Choice Requires="a14">
           <p:sp>
             <p:nvSpPr>
               <p:cNvPr id="3" name="Content Placeholder 2"/>
@@ -8702,7 +8681,7 @@
             </p:txBody>
           </p:sp>
         </mc:Choice>
-        <mc:Fallback>
+        <mc:Fallback xmlns="">
           <p:sp>
             <p:nvSpPr>
               <p:cNvPr id="3" name="Content Placeholder 2"/>
@@ -8832,8 +8811,8 @@
           </a:p>
         </p:txBody>
       </p:sp>
-      <mc:AlternateContent xmlns:mc="http://schemas.openxmlformats.org/markup-compatibility/2006">
-        <mc:Choice xmlns:a14="http://schemas.microsoft.com/office/drawing/2010/main" Requires="a14">
+      <mc:AlternateContent xmlns:mc="http://schemas.openxmlformats.org/markup-compatibility/2006" xmlns:a14="http://schemas.microsoft.com/office/drawing/2010/main">
+        <mc:Choice Requires="a14">
           <p:sp>
             <p:nvSpPr>
               <p:cNvPr id="3" name="Content Placeholder 2"/>
@@ -9623,7 +9602,7 @@
             </p:txBody>
           </p:sp>
         </mc:Choice>
-        <mc:Fallback>
+        <mc:Fallback xmlns="">
           <p:sp>
             <p:nvSpPr>
               <p:cNvPr id="3" name="Content Placeholder 2"/>
@@ -9753,8 +9732,8 @@
           </a:p>
         </p:txBody>
       </p:sp>
-      <mc:AlternateContent xmlns:mc="http://schemas.openxmlformats.org/markup-compatibility/2006">
-        <mc:Choice xmlns:a14="http://schemas.microsoft.com/office/drawing/2010/main" Requires="a14">
+      <mc:AlternateContent xmlns:mc="http://schemas.openxmlformats.org/markup-compatibility/2006" xmlns:a14="http://schemas.microsoft.com/office/drawing/2010/main">
+        <mc:Choice Requires="a14">
           <p:sp>
             <p:nvSpPr>
               <p:cNvPr id="3" name="Content Placeholder 2"/>
@@ -9987,7 +9966,7 @@
                           <m:begChr m:val="{"/>
                           <m:endChr m:val="}"/>
                           <m:ctrlPr>
-                            <a:rPr lang="en-US" sz="3200" b="0" i="0" dirty="0" smtClean="0">
+                            <a:rPr lang="en-US" sz="3200" b="0" i="1" dirty="0" smtClean="0">
                               <a:latin typeface="Cambria Math" panose="02040503050406030204" pitchFamily="18" charset="0"/>
                             </a:rPr>
                           </m:ctrlPr>
@@ -10049,7 +10028,7 @@
             </p:txBody>
           </p:sp>
         </mc:Choice>
-        <mc:Fallback>
+        <mc:Fallback xmlns="">
           <p:sp>
             <p:nvSpPr>
               <p:cNvPr id="3" name="Content Placeholder 2"/>
@@ -10179,8 +10158,8 @@
           </a:p>
         </p:txBody>
       </p:sp>
-      <mc:AlternateContent xmlns:mc="http://schemas.openxmlformats.org/markup-compatibility/2006">
-        <mc:Choice xmlns:a14="http://schemas.microsoft.com/office/drawing/2010/main" Requires="a14">
+      <mc:AlternateContent xmlns:mc="http://schemas.openxmlformats.org/markup-compatibility/2006" xmlns:a14="http://schemas.microsoft.com/office/drawing/2010/main">
+        <mc:Choice Requires="a14">
           <p:sp>
             <p:nvSpPr>
               <p:cNvPr id="3" name="Content Placeholder 2"/>
@@ -10539,7 +10518,7 @@
             </p:txBody>
           </p:sp>
         </mc:Choice>
-        <mc:Fallback>
+        <mc:Fallback xmlns="">
           <p:sp>
             <p:nvSpPr>
               <p:cNvPr id="3" name="Content Placeholder 2"/>
@@ -10979,6 +10958,10 @@
               </a:p>
               <a:p>
                 <a:pPr algn="just"/>
+                <a:r>
+                  <a:rPr lang="uk-UA" sz="3200" dirty="0"/>
+                  <a:t>Для швидкого обчислення ймовірностей використаємо префіксне дерево для характеристик</a:t>
+                </a:r>
                 <a:endParaRPr lang="en-US" sz="3200" dirty="0"/>
               </a:p>
             </p:txBody>
@@ -11003,7 +10986,7 @@
               <a:blipFill>
                 <a:blip r:embed="rId2"/>
                 <a:stretch>
-                  <a:fillRect l="-1333" t="-2763"/>
+                  <a:fillRect l="-1333" t="-2763" r="-1449"/>
                 </a:stretch>
               </a:blipFill>
             </p:spPr>

</xml_diff>